<commit_message>
Small change, better readibility
</commit_message>
<xml_diff>
--- a/extras/Plan2.pptx
+++ b/extras/Plan2.pptx
@@ -104,7 +104,49 @@
       </a:defRPr>
     </a:lvl9pPr>
   </p:defaultTextStyle>
+  <p:extLst>
+    <p:ext uri="{EFAFB233-063F-42B5-8137-9DF3F51BA10A}">
+      <p15:sldGuideLst xmlns:p15="http://schemas.microsoft.com/office/powerpoint/2012/main"/>
+    </p:ext>
+  </p:extLst>
 </p:presentation>
+</file>
+
+<file path=ppt/changesInfos/changesInfo1.xml><?xml version="1.0" encoding="utf-8"?>
+<pc:chgInfo xmlns:a="http://schemas.openxmlformats.org/drawingml/2006/main" xmlns:r="http://schemas.openxmlformats.org/officeDocument/2006/relationships" xmlns:ac="http://schemas.microsoft.com/office/drawing/2013/main/command" xmlns:pc="http://schemas.microsoft.com/office/powerpoint/2013/main/command">
+  <pc:docChgLst>
+    <pc:chgData name="Lamba, Shashank" userId="0a59a5e2-3a84-42b1-b413-e1c0ff0c8279" providerId="ADAL" clId="{FDAEB463-C192-4197-BE44-B8016BFD332B}"/>
+    <pc:docChg chg="undo custSel modSld">
+      <pc:chgData name="Lamba, Shashank" userId="0a59a5e2-3a84-42b1-b413-e1c0ff0c8279" providerId="ADAL" clId="{FDAEB463-C192-4197-BE44-B8016BFD332B}" dt="2023-10-03T13:49:53.055" v="25" actId="14100"/>
+      <pc:docMkLst>
+        <pc:docMk/>
+      </pc:docMkLst>
+      <pc:sldChg chg="modSp mod">
+        <pc:chgData name="Lamba, Shashank" userId="0a59a5e2-3a84-42b1-b413-e1c0ff0c8279" providerId="ADAL" clId="{FDAEB463-C192-4197-BE44-B8016BFD332B}" dt="2023-10-03T13:49:53.055" v="25" actId="14100"/>
+        <pc:sldMkLst>
+          <pc:docMk/>
+          <pc:sldMk cId="961592177" sldId="257"/>
+        </pc:sldMkLst>
+        <pc:spChg chg="mod">
+          <ac:chgData name="Lamba, Shashank" userId="0a59a5e2-3a84-42b1-b413-e1c0ff0c8279" providerId="ADAL" clId="{FDAEB463-C192-4197-BE44-B8016BFD332B}" dt="2023-10-03T13:48:32.120" v="10" actId="1076"/>
+          <ac:spMkLst>
+            <pc:docMk/>
+            <pc:sldMk cId="961592177" sldId="257"/>
+            <ac:spMk id="4" creationId="{2B03F9F3-1A0D-AE48-1BBF-82CF0BF8A1E5}"/>
+          </ac:spMkLst>
+        </pc:spChg>
+        <pc:cxnChg chg="mod">
+          <ac:chgData name="Lamba, Shashank" userId="0a59a5e2-3a84-42b1-b413-e1c0ff0c8279" providerId="ADAL" clId="{FDAEB463-C192-4197-BE44-B8016BFD332B}" dt="2023-10-03T13:49:53.055" v="25" actId="14100"/>
+          <ac:cxnSpMkLst>
+            <pc:docMk/>
+            <pc:sldMk cId="961592177" sldId="257"/>
+            <ac:cxnSpMk id="136" creationId="{B5EF3800-3151-CF4A-9097-D559465853D9}"/>
+          </ac:cxnSpMkLst>
+        </pc:cxnChg>
+      </pc:sldChg>
+    </pc:docChg>
+  </pc:docChgLst>
+</pc:chgInfo>
 </file>
 
 <file path=ppt/slideLayouts/slideLayout1.xml><?xml version="1.0" encoding="utf-8"?>
@@ -254,7 +296,7 @@
           <a:p>
             <a:fld id="{8A6C55E0-AF1F-4140-89E3-D0851F433838}" type="datetimeFigureOut">
               <a:rPr lang="en-US" smtClean="0"/>
-              <a:t>10/2/2023</a:t>
+              <a:t>10/3/2023</a:t>
             </a:fld>
             <a:endParaRPr lang="en-US"/>
           </a:p>
@@ -452,7 +494,7 @@
           <a:p>
             <a:fld id="{8A6C55E0-AF1F-4140-89E3-D0851F433838}" type="datetimeFigureOut">
               <a:rPr lang="en-US" smtClean="0"/>
-              <a:t>10/2/2023</a:t>
+              <a:t>10/3/2023</a:t>
             </a:fld>
             <a:endParaRPr lang="en-US"/>
           </a:p>
@@ -660,7 +702,7 @@
           <a:p>
             <a:fld id="{8A6C55E0-AF1F-4140-89E3-D0851F433838}" type="datetimeFigureOut">
               <a:rPr lang="en-US" smtClean="0"/>
-              <a:t>10/2/2023</a:t>
+              <a:t>10/3/2023</a:t>
             </a:fld>
             <a:endParaRPr lang="en-US"/>
           </a:p>
@@ -858,7 +900,7 @@
           <a:p>
             <a:fld id="{8A6C55E0-AF1F-4140-89E3-D0851F433838}" type="datetimeFigureOut">
               <a:rPr lang="en-US" smtClean="0"/>
-              <a:t>10/2/2023</a:t>
+              <a:t>10/3/2023</a:t>
             </a:fld>
             <a:endParaRPr lang="en-US"/>
           </a:p>
@@ -1133,7 +1175,7 @@
           <a:p>
             <a:fld id="{8A6C55E0-AF1F-4140-89E3-D0851F433838}" type="datetimeFigureOut">
               <a:rPr lang="en-US" smtClean="0"/>
-              <a:t>10/2/2023</a:t>
+              <a:t>10/3/2023</a:t>
             </a:fld>
             <a:endParaRPr lang="en-US"/>
           </a:p>
@@ -1398,7 +1440,7 @@
           <a:p>
             <a:fld id="{8A6C55E0-AF1F-4140-89E3-D0851F433838}" type="datetimeFigureOut">
               <a:rPr lang="en-US" smtClean="0"/>
-              <a:t>10/2/2023</a:t>
+              <a:t>10/3/2023</a:t>
             </a:fld>
             <a:endParaRPr lang="en-US"/>
           </a:p>
@@ -1810,7 +1852,7 @@
           <a:p>
             <a:fld id="{8A6C55E0-AF1F-4140-89E3-D0851F433838}" type="datetimeFigureOut">
               <a:rPr lang="en-US" smtClean="0"/>
-              <a:t>10/2/2023</a:t>
+              <a:t>10/3/2023</a:t>
             </a:fld>
             <a:endParaRPr lang="en-US"/>
           </a:p>
@@ -1951,7 +1993,7 @@
           <a:p>
             <a:fld id="{8A6C55E0-AF1F-4140-89E3-D0851F433838}" type="datetimeFigureOut">
               <a:rPr lang="en-US" smtClean="0"/>
-              <a:t>10/2/2023</a:t>
+              <a:t>10/3/2023</a:t>
             </a:fld>
             <a:endParaRPr lang="en-US"/>
           </a:p>
@@ -2064,7 +2106,7 @@
           <a:p>
             <a:fld id="{8A6C55E0-AF1F-4140-89E3-D0851F433838}" type="datetimeFigureOut">
               <a:rPr lang="en-US" smtClean="0"/>
-              <a:t>10/2/2023</a:t>
+              <a:t>10/3/2023</a:t>
             </a:fld>
             <a:endParaRPr lang="en-US"/>
           </a:p>
@@ -2375,7 +2417,7 @@
           <a:p>
             <a:fld id="{8A6C55E0-AF1F-4140-89E3-D0851F433838}" type="datetimeFigureOut">
               <a:rPr lang="en-US" smtClean="0"/>
-              <a:t>10/2/2023</a:t>
+              <a:t>10/3/2023</a:t>
             </a:fld>
             <a:endParaRPr lang="en-US"/>
           </a:p>
@@ -2663,7 +2705,7 @@
           <a:p>
             <a:fld id="{8A6C55E0-AF1F-4140-89E3-D0851F433838}" type="datetimeFigureOut">
               <a:rPr lang="en-US" smtClean="0"/>
-              <a:t>10/2/2023</a:t>
+              <a:t>10/3/2023</a:t>
             </a:fld>
             <a:endParaRPr lang="en-US"/>
           </a:p>
@@ -2904,7 +2946,7 @@
           <a:p>
             <a:fld id="{8A6C55E0-AF1F-4140-89E3-D0851F433838}" type="datetimeFigureOut">
               <a:rPr lang="en-US" smtClean="0"/>
-              <a:t>10/2/2023</a:t>
+              <a:t>10/3/2023</a:t>
             </a:fld>
             <a:endParaRPr lang="en-US"/>
           </a:p>
@@ -3422,7 +3464,7 @@
         </p:nvSpPr>
         <p:spPr>
           <a:xfrm>
-            <a:off x="314326" y="256162"/>
+            <a:off x="314326" y="237112"/>
             <a:ext cx="6572250" cy="2914650"/>
           </a:xfrm>
           <a:prstGeom prst="rect">
@@ -5286,18 +5328,20 @@
             </a:extLst>
           </p:cNvPr>
           <p:cNvCxnSpPr>
-            <a:endCxn id="42" idx="3"/>
+            <a:cxnSpLocks/>
+            <a:stCxn id="2" idx="2"/>
+            <a:endCxn id="42" idx="0"/>
           </p:cNvCxnSpPr>
           <p:nvPr/>
         </p:nvCxnSpPr>
         <p:spPr>
-          <a:xfrm rot="10800000" flipV="1">
-            <a:off x="2166038" y="2259948"/>
-            <a:ext cx="2935503" cy="2172034"/>
+          <a:xfrm rot="5400000">
+            <a:off x="2638221" y="1018625"/>
+            <a:ext cx="1620843" cy="4103498"/>
           </a:xfrm>
           <a:prstGeom prst="bentConnector3">
             <a:avLst>
-              <a:gd name="adj1" fmla="val 16347"/>
+              <a:gd name="adj1" fmla="val 39422"/>
             </a:avLst>
           </a:prstGeom>
           <a:ln>

</xml_diff>